<commit_message>
make select-azuresubscription mandotory to make experience consistent
</commit_message>
<xml_diff>
--- a/Azure SQL Database - WingTipTickets HOL introduction and roadmap v2 1.pptx
+++ b/Azure SQL Database - WingTipTickets HOL introduction and roadmap v2 1.pptx
@@ -206,7 +206,7 @@
           <a:p>
             <a:fld id="{4047A352-41CF-4AED-8367-CE599BDE43FE}" type="datetimeFigureOut">
               <a:rPr lang="en-NZ" smtClean="0"/>
-              <a:t>1/09/2015</a:t>
+              <a:t>27/09/2015</a:t>
             </a:fld>
             <a:endParaRPr lang="en-NZ"/>
           </a:p>
@@ -679,7 +679,7 @@
           <a:p>
             <a:fld id="{79783B37-3561-45DF-9DF7-7661BD4BD9F5}" type="datetimeFigureOut">
               <a:rPr lang="en-NZ" smtClean="0"/>
-              <a:t>1/09/2015</a:t>
+              <a:t>27/09/2015</a:t>
             </a:fld>
             <a:endParaRPr lang="en-NZ"/>
           </a:p>
@@ -1309,7 +1309,7 @@
           <a:p>
             <a:fld id="{C5CFC6D6-7E4B-4808-8D93-BAB472467609}" type="datetime1">
               <a:rPr lang="en-NZ" smtClean="0"/>
-              <a:t>1/09/2015</a:t>
+              <a:t>27/09/2015</a:t>
             </a:fld>
             <a:endParaRPr lang="en-NZ" dirty="0"/>
           </a:p>
@@ -1581,7 +1581,7 @@
           <a:p>
             <a:fld id="{C5CFC6D6-7E4B-4808-8D93-BAB472467609}" type="datetime1">
               <a:rPr lang="en-NZ" smtClean="0"/>
-              <a:t>1/09/2015</a:t>
+              <a:t>27/09/2015</a:t>
             </a:fld>
             <a:endParaRPr lang="en-NZ" dirty="0"/>
           </a:p>
@@ -1826,7 +1826,7 @@
           <a:p>
             <a:fld id="{79783B37-3561-45DF-9DF7-7661BD4BD9F5}" type="datetimeFigureOut">
               <a:rPr lang="en-NZ" smtClean="0"/>
-              <a:t>1/09/2015</a:t>
+              <a:t>27/09/2015</a:t>
             </a:fld>
             <a:endParaRPr lang="en-NZ"/>
           </a:p>
@@ -2096,7 +2096,7 @@
           <a:p>
             <a:fld id="{79783B37-3561-45DF-9DF7-7661BD4BD9F5}" type="datetimeFigureOut">
               <a:rPr lang="en-NZ" smtClean="0"/>
-              <a:t>1/09/2015</a:t>
+              <a:t>27/09/2015</a:t>
             </a:fld>
             <a:endParaRPr lang="en-NZ"/>
           </a:p>
@@ -2454,7 +2454,7 @@
           <a:p>
             <a:fld id="{79783B37-3561-45DF-9DF7-7661BD4BD9F5}" type="datetimeFigureOut">
               <a:rPr lang="en-NZ" smtClean="0"/>
-              <a:t>1/09/2015</a:t>
+              <a:t>27/09/2015</a:t>
             </a:fld>
             <a:endParaRPr lang="en-NZ"/>
           </a:p>
@@ -2636,7 +2636,7 @@
           <a:p>
             <a:fld id="{79783B37-3561-45DF-9DF7-7661BD4BD9F5}" type="datetimeFigureOut">
               <a:rPr lang="en-NZ" smtClean="0"/>
-              <a:t>1/09/2015</a:t>
+              <a:t>27/09/2015</a:t>
             </a:fld>
             <a:endParaRPr lang="en-NZ"/>
           </a:p>
@@ -2992,7 +2992,7 @@
           <a:p>
             <a:fld id="{79783B37-3561-45DF-9DF7-7661BD4BD9F5}" type="datetimeFigureOut">
               <a:rPr lang="en-NZ" smtClean="0"/>
-              <a:t>1/09/2015</a:t>
+              <a:t>27/09/2015</a:t>
             </a:fld>
             <a:endParaRPr lang="en-NZ"/>
           </a:p>
@@ -3679,7 +3679,7 @@
           <a:p>
             <a:fld id="{79783B37-3561-45DF-9DF7-7661BD4BD9F5}" type="datetimeFigureOut">
               <a:rPr lang="en-NZ" smtClean="0"/>
-              <a:t>1/09/2015</a:t>
+              <a:t>27/09/2015</a:t>
             </a:fld>
             <a:endParaRPr lang="en-NZ"/>
           </a:p>
@@ -4332,7 +4332,7 @@
           <a:p>
             <a:fld id="{C5CFC6D6-7E4B-4808-8D93-BAB472467609}" type="datetime1">
               <a:rPr lang="en-NZ" smtClean="0"/>
-              <a:t>1/09/2015</a:t>
+              <a:t>27/09/2015</a:t>
             </a:fld>
             <a:endParaRPr lang="en-NZ" dirty="0"/>
           </a:p>
@@ -5034,7 +5034,15 @@
             </a:pPr>
             <a:r>
               <a:rPr lang="en-US" dirty="0" smtClean="0"/>
-              <a:t>Ensure that you can connect to the VM (wingtipseptdatacamp.cloudapp.net:63907)</a:t>
+              <a:t>Ensure that you can connect to the VM (</a:t>
+            </a:r>
+            <a:r>
+              <a:rPr lang="en-US" dirty="0" smtClean="0"/>
+              <a:t>wingtipsept29datacamp.cloudapp.net:63907</a:t>
+            </a:r>
+            <a:r>
+              <a:rPr lang="en-US" dirty="0" smtClean="0"/>
+              <a:t>)</a:t>
             </a:r>
           </a:p>
           <a:p>
@@ -6406,7 +6414,7 @@
             <a:pPr lvl="2"/>
             <a:r>
               <a:rPr lang="en-US" sz="2000" dirty="0" smtClean="0"/>
-              <a:t>Optional - Select-</a:t>
+              <a:t>Select-</a:t>
             </a:r>
             <a:r>
               <a:rPr lang="en-US" sz="2000" dirty="0" err="1" smtClean="0"/>
@@ -6821,21 +6829,21 @@
                 <a:gridCol w="1073713">
                   <a:extLst>
                     <a:ext uri="{9D8B030D-6E8A-4147-A177-3AD203B41FA5}">
-                      <a16:colId xmlns:a16="http://schemas.microsoft.com/office/drawing/2014/main" val="20000"/>
+                      <a16:colId xmlns:a16="http://schemas.microsoft.com/office/drawing/2014/main" xmlns="" val="20000"/>
                     </a:ext>
                   </a:extLst>
                 </a:gridCol>
                 <a:gridCol w="1347019">
                   <a:extLst>
                     <a:ext uri="{9D8B030D-6E8A-4147-A177-3AD203B41FA5}">
-                      <a16:colId xmlns:a16="http://schemas.microsoft.com/office/drawing/2014/main" val="20001"/>
+                      <a16:colId xmlns:a16="http://schemas.microsoft.com/office/drawing/2014/main" xmlns="" val="20001"/>
                     </a:ext>
                   </a:extLst>
                 </a:gridCol>
                 <a:gridCol w="3065668">
                   <a:extLst>
                     <a:ext uri="{9D8B030D-6E8A-4147-A177-3AD203B41FA5}">
-                      <a16:colId xmlns:a16="http://schemas.microsoft.com/office/drawing/2014/main" val="2145477352"/>
+                      <a16:colId xmlns:a16="http://schemas.microsoft.com/office/drawing/2014/main" xmlns="" val="2145477352"/>
                     </a:ext>
                   </a:extLst>
                 </a:gridCol>
@@ -6902,7 +6910,7 @@
                 </a:tc>
                 <a:extLst>
                   <a:ext uri="{0D108BD9-81ED-4DB2-BD59-A6C34878D82A}">
-                    <a16:rowId xmlns:a16="http://schemas.microsoft.com/office/drawing/2014/main" val="10000"/>
+                    <a16:rowId xmlns:a16="http://schemas.microsoft.com/office/drawing/2014/main" xmlns="" val="10000"/>
                   </a:ext>
                 </a:extLst>
               </a:tr>
@@ -6983,7 +6991,7 @@
                 </a:tc>
                 <a:extLst>
                   <a:ext uri="{0D108BD9-81ED-4DB2-BD59-A6C34878D82A}">
-                    <a16:rowId xmlns:a16="http://schemas.microsoft.com/office/drawing/2014/main" val="2739472372"/>
+                    <a16:rowId xmlns:a16="http://schemas.microsoft.com/office/drawing/2014/main" xmlns="" val="2739472372"/>
                   </a:ext>
                 </a:extLst>
               </a:tr>
@@ -7070,7 +7078,7 @@
                 </a:tc>
                 <a:extLst>
                   <a:ext uri="{0D108BD9-81ED-4DB2-BD59-A6C34878D82A}">
-                    <a16:rowId xmlns:a16="http://schemas.microsoft.com/office/drawing/2014/main" val="753878618"/>
+                    <a16:rowId xmlns:a16="http://schemas.microsoft.com/office/drawing/2014/main" xmlns="" val="753878618"/>
                   </a:ext>
                 </a:extLst>
               </a:tr>
@@ -7169,7 +7177,7 @@
                 </a:tc>
                 <a:extLst>
                   <a:ext uri="{0D108BD9-81ED-4DB2-BD59-A6C34878D82A}">
-                    <a16:rowId xmlns:a16="http://schemas.microsoft.com/office/drawing/2014/main" val="10001"/>
+                    <a16:rowId xmlns:a16="http://schemas.microsoft.com/office/drawing/2014/main" xmlns="" val="10001"/>
                   </a:ext>
                 </a:extLst>
               </a:tr>
@@ -7277,7 +7285,7 @@
                 </a:tc>
                 <a:extLst>
                   <a:ext uri="{0D108BD9-81ED-4DB2-BD59-A6C34878D82A}">
-                    <a16:rowId xmlns:a16="http://schemas.microsoft.com/office/drawing/2014/main" val="10002"/>
+                    <a16:rowId xmlns:a16="http://schemas.microsoft.com/office/drawing/2014/main" xmlns="" val="10002"/>
                   </a:ext>
                 </a:extLst>
               </a:tr>
@@ -7496,7 +7504,7 @@
                 </a:tc>
                 <a:extLst>
                   <a:ext uri="{0D108BD9-81ED-4DB2-BD59-A6C34878D82A}">
-                    <a16:rowId xmlns:a16="http://schemas.microsoft.com/office/drawing/2014/main" val="10003"/>
+                    <a16:rowId xmlns:a16="http://schemas.microsoft.com/office/drawing/2014/main" xmlns="" val="10003"/>
                   </a:ext>
                 </a:extLst>
               </a:tr>
@@ -7694,7 +7702,7 @@
                 </a:tc>
                 <a:extLst>
                   <a:ext uri="{0D108BD9-81ED-4DB2-BD59-A6C34878D82A}">
-                    <a16:rowId xmlns:a16="http://schemas.microsoft.com/office/drawing/2014/main" val="10004"/>
+                    <a16:rowId xmlns:a16="http://schemas.microsoft.com/office/drawing/2014/main" xmlns="" val="10004"/>
                   </a:ext>
                 </a:extLst>
               </a:tr>
@@ -7887,7 +7895,7 @@
                 </a:tc>
                 <a:extLst>
                   <a:ext uri="{0D108BD9-81ED-4DB2-BD59-A6C34878D82A}">
-                    <a16:rowId xmlns:a16="http://schemas.microsoft.com/office/drawing/2014/main" val="2248212393"/>
+                    <a16:rowId xmlns:a16="http://schemas.microsoft.com/office/drawing/2014/main" xmlns="" val="2248212393"/>
                   </a:ext>
                 </a:extLst>
               </a:tr>
@@ -7983,7 +7991,7 @@
                 </a:tc>
                 <a:extLst>
                   <a:ext uri="{0D108BD9-81ED-4DB2-BD59-A6C34878D82A}">
-                    <a16:rowId xmlns:a16="http://schemas.microsoft.com/office/drawing/2014/main" val="3736867791"/>
+                    <a16:rowId xmlns:a16="http://schemas.microsoft.com/office/drawing/2014/main" xmlns="" val="3736867791"/>
                   </a:ext>
                 </a:extLst>
               </a:tr>
@@ -8079,7 +8087,7 @@
                 </a:tc>
                 <a:extLst>
                   <a:ext uri="{0D108BD9-81ED-4DB2-BD59-A6C34878D82A}">
-                    <a16:rowId xmlns:a16="http://schemas.microsoft.com/office/drawing/2014/main" val="2381509833"/>
+                    <a16:rowId xmlns:a16="http://schemas.microsoft.com/office/drawing/2014/main" xmlns="" val="2381509833"/>
                   </a:ext>
                 </a:extLst>
               </a:tr>
@@ -9164,6 +9172,21 @@
 </file>
 
 <file path=customXml/item1.xml><?xml version="1.0" encoding="utf-8"?>
+<p:properties xmlns:p="http://schemas.microsoft.com/office/2006/metadata/properties" xmlns:xsi="http://www.w3.org/2001/XMLSchema-instance" xmlns:pc="http://schemas.microsoft.com/office/infopath/2007/PartnerControls">
+  <documentManagement/>
+</p:properties>
+</file>
+
+<file path=customXml/item2.xml><?xml version="1.0" encoding="utf-8"?>
+<?mso-contentType ?>
+<FormTemplates xmlns="http://schemas.microsoft.com/sharepoint/v3/contenttype/forms">
+  <Display>DocumentLibraryForm</Display>
+  <Edit>DocumentLibraryForm</Edit>
+  <New>DocumentLibraryForm</New>
+</FormTemplates>
+</file>
+
+<file path=customXml/item3.xml><?xml version="1.0" encoding="utf-8"?>
 <ct:contentTypeSchema xmlns:ct="http://schemas.microsoft.com/office/2006/metadata/contentType" xmlns:ma="http://schemas.microsoft.com/office/2006/metadata/properties/metaAttributes" ct:_="" ma:_="" ma:contentTypeName="Document" ma:contentTypeID="0x0101000B8588C332A19143B76F4B122D6916F0" ma:contentTypeVersion="3" ma:contentTypeDescription="Create a new document." ma:contentTypeScope="" ma:versionID="9477869582d2dcd8d7c168a0aba4e29a">
   <xsd:schema xmlns:xsd="http://www.w3.org/2001/XMLSchema" xmlns:xs="http://www.w3.org/2001/XMLSchema" xmlns:p="http://schemas.microsoft.com/office/2006/metadata/properties" xmlns:ns2="4c9d5b1a-dba0-446a-8e45-7a9ed15a6f00" targetNamespace="http://schemas.microsoft.com/office/2006/metadata/properties" ma:root="true" ma:fieldsID="99a8b0ab1b6ca91437e22a96cb29fb4e" ns2:_="">
     <xsd:import namespace="4c9d5b1a-dba0-446a-8e45-7a9ed15a6f00"/>
@@ -9317,22 +9340,31 @@
 </ct:contentTypeSchema>
 </file>
 
-<file path=customXml/item2.xml><?xml version="1.0" encoding="utf-8"?>
-<?mso-contentType ?>
-<FormTemplates xmlns="http://schemas.microsoft.com/sharepoint/v3/contenttype/forms">
-  <Display>DocumentLibraryForm</Display>
-  <Edit>DocumentLibraryForm</Edit>
-  <New>DocumentLibraryForm</New>
-</FormTemplates>
+<file path=customXml/itemProps1.xml><?xml version="1.0" encoding="utf-8"?>
+<ds:datastoreItem xmlns:ds="http://schemas.openxmlformats.org/officeDocument/2006/customXml" ds:itemID="{3876E3CC-B2FB-411A-A5D5-4517382E5C5D}">
+  <ds:schemaRefs>
+    <ds:schemaRef ds:uri="http://schemas.microsoft.com/office/2006/documentManagement/types"/>
+    <ds:schemaRef ds:uri="http://purl.org/dc/terms/"/>
+    <ds:schemaRef ds:uri="http://www.w3.org/XML/1998/namespace"/>
+    <ds:schemaRef ds:uri="http://purl.org/dc/dcmitype/"/>
+    <ds:schemaRef ds:uri="4c9d5b1a-dba0-446a-8e45-7a9ed15a6f00"/>
+    <ds:schemaRef ds:uri="http://schemas.microsoft.com/office/2006/metadata/properties"/>
+    <ds:schemaRef ds:uri="http://schemas.microsoft.com/office/infopath/2007/PartnerControls"/>
+    <ds:schemaRef ds:uri="http://schemas.openxmlformats.org/package/2006/metadata/core-properties"/>
+    <ds:schemaRef ds:uri="http://purl.org/dc/elements/1.1/"/>
+  </ds:schemaRefs>
+</ds:datastoreItem>
 </file>
 
-<file path=customXml/item3.xml><?xml version="1.0" encoding="utf-8"?>
-<p:properties xmlns:p="http://schemas.microsoft.com/office/2006/metadata/properties" xmlns:xsi="http://www.w3.org/2001/XMLSchema-instance" xmlns:pc="http://schemas.microsoft.com/office/infopath/2007/PartnerControls">
-  <documentManagement/>
-</p:properties>
+<file path=customXml/itemProps2.xml><?xml version="1.0" encoding="utf-8"?>
+<ds:datastoreItem xmlns:ds="http://schemas.openxmlformats.org/officeDocument/2006/customXml" ds:itemID="{B003CD0A-443A-485C-804D-6841659B337D}">
+  <ds:schemaRefs>
+    <ds:schemaRef ds:uri="http://schemas.microsoft.com/sharepoint/v3/contenttype/forms"/>
+  </ds:schemaRefs>
+</ds:datastoreItem>
 </file>
 
-<file path=customXml/itemProps1.xml><?xml version="1.0" encoding="utf-8"?>
+<file path=customXml/itemProps3.xml><?xml version="1.0" encoding="utf-8"?>
 <ds:datastoreItem xmlns:ds="http://schemas.openxmlformats.org/officeDocument/2006/customXml" ds:itemID="{C165D72E-384F-49C0-81DB-716C9DCB72DB}">
   <ds:schemaRefs>
     <ds:schemaRef ds:uri="http://schemas.microsoft.com/office/2006/metadata/contentType"/>
@@ -9348,28 +9380,4 @@
     <ds:schemaRef ds:uri="http://schemas.microsoft.com/internal/obd"/>
   </ds:schemaRefs>
 </ds:datastoreItem>
-</file>
-
-<file path=customXml/itemProps2.xml><?xml version="1.0" encoding="utf-8"?>
-<ds:datastoreItem xmlns:ds="http://schemas.openxmlformats.org/officeDocument/2006/customXml" ds:itemID="{B003CD0A-443A-485C-804D-6841659B337D}">
-  <ds:schemaRefs>
-    <ds:schemaRef ds:uri="http://schemas.microsoft.com/sharepoint/v3/contenttype/forms"/>
-  </ds:schemaRefs>
-</ds:datastoreItem>
-</file>
-
-<file path=customXml/itemProps3.xml><?xml version="1.0" encoding="utf-8"?>
-<ds:datastoreItem xmlns:ds="http://schemas.openxmlformats.org/officeDocument/2006/customXml" ds:itemID="{3876E3CC-B2FB-411A-A5D5-4517382E5C5D}">
-  <ds:schemaRefs>
-    <ds:schemaRef ds:uri="http://schemas.microsoft.com/office/2006/documentManagement/types"/>
-    <ds:schemaRef ds:uri="http://purl.org/dc/terms/"/>
-    <ds:schemaRef ds:uri="http://www.w3.org/XML/1998/namespace"/>
-    <ds:schemaRef ds:uri="http://purl.org/dc/dcmitype/"/>
-    <ds:schemaRef ds:uri="4c9d5b1a-dba0-446a-8e45-7a9ed15a6f00"/>
-    <ds:schemaRef ds:uri="http://schemas.microsoft.com/office/2006/metadata/properties"/>
-    <ds:schemaRef ds:uri="http://schemas.microsoft.com/office/infopath/2007/PartnerControls"/>
-    <ds:schemaRef ds:uri="http://schemas.openxmlformats.org/package/2006/metadata/core-properties"/>
-    <ds:schemaRef ds:uri="http://purl.org/dc/elements/1.1/"/>
-  </ds:schemaRefs>
-</ds:datastoreItem>
 </file>
</xml_diff>